<commit_message>
Cover Photo(Fig. 1) is updated
</commit_message>
<xml_diff>
--- a/RA-L/pictures/pdf/IntroSwarmPic.pptx
+++ b/RA-L/pictures/pdf/IntroSwarmPic.pptx
@@ -288,7 +288,7 @@
           <a:p>
             <a:fld id="{05487026-7C3F-E447-98E7-AF520D29232F}" type="datetimeFigureOut">
               <a:rPr lang="en-US" smtClean="0"/>
-              <a:t>1/28/16</a:t>
+              <a:t>8/26/16</a:t>
             </a:fld>
             <a:endParaRPr lang="en-US"/>
           </a:p>
@@ -458,7 +458,7 @@
           <a:p>
             <a:fld id="{05487026-7C3F-E447-98E7-AF520D29232F}" type="datetimeFigureOut">
               <a:rPr lang="en-US" smtClean="0"/>
-              <a:t>1/28/16</a:t>
+              <a:t>8/26/16</a:t>
             </a:fld>
             <a:endParaRPr lang="en-US"/>
           </a:p>
@@ -638,7 +638,7 @@
           <a:p>
             <a:fld id="{05487026-7C3F-E447-98E7-AF520D29232F}" type="datetimeFigureOut">
               <a:rPr lang="en-US" smtClean="0"/>
-              <a:t>1/28/16</a:t>
+              <a:t>8/26/16</a:t>
             </a:fld>
             <a:endParaRPr lang="en-US"/>
           </a:p>
@@ -808,7 +808,7 @@
           <a:p>
             <a:fld id="{05487026-7C3F-E447-98E7-AF520D29232F}" type="datetimeFigureOut">
               <a:rPr lang="en-US" smtClean="0"/>
-              <a:t>1/28/16</a:t>
+              <a:t>8/26/16</a:t>
             </a:fld>
             <a:endParaRPr lang="en-US"/>
           </a:p>
@@ -1054,7 +1054,7 @@
           <a:p>
             <a:fld id="{05487026-7C3F-E447-98E7-AF520D29232F}" type="datetimeFigureOut">
               <a:rPr lang="en-US" smtClean="0"/>
-              <a:t>1/28/16</a:t>
+              <a:t>8/26/16</a:t>
             </a:fld>
             <a:endParaRPr lang="en-US"/>
           </a:p>
@@ -1342,7 +1342,7 @@
           <a:p>
             <a:fld id="{05487026-7C3F-E447-98E7-AF520D29232F}" type="datetimeFigureOut">
               <a:rPr lang="en-US" smtClean="0"/>
-              <a:t>1/28/16</a:t>
+              <a:t>8/26/16</a:t>
             </a:fld>
             <a:endParaRPr lang="en-US"/>
           </a:p>
@@ -1769,7 +1769,7 @@
           <a:p>
             <a:fld id="{05487026-7C3F-E447-98E7-AF520D29232F}" type="datetimeFigureOut">
               <a:rPr lang="en-US" smtClean="0"/>
-              <a:t>1/28/16</a:t>
+              <a:t>8/26/16</a:t>
             </a:fld>
             <a:endParaRPr lang="en-US"/>
           </a:p>
@@ -1887,7 +1887,7 @@
           <a:p>
             <a:fld id="{05487026-7C3F-E447-98E7-AF520D29232F}" type="datetimeFigureOut">
               <a:rPr lang="en-US" smtClean="0"/>
-              <a:t>1/28/16</a:t>
+              <a:t>8/26/16</a:t>
             </a:fld>
             <a:endParaRPr lang="en-US"/>
           </a:p>
@@ -1982,7 +1982,7 @@
           <a:p>
             <a:fld id="{05487026-7C3F-E447-98E7-AF520D29232F}" type="datetimeFigureOut">
               <a:rPr lang="en-US" smtClean="0"/>
-              <a:t>1/28/16</a:t>
+              <a:t>8/26/16</a:t>
             </a:fld>
             <a:endParaRPr lang="en-US"/>
           </a:p>
@@ -2259,7 +2259,7 @@
           <a:p>
             <a:fld id="{05487026-7C3F-E447-98E7-AF520D29232F}" type="datetimeFigureOut">
               <a:rPr lang="en-US" smtClean="0"/>
-              <a:t>1/28/16</a:t>
+              <a:t>8/26/16</a:t>
             </a:fld>
             <a:endParaRPr lang="en-US"/>
           </a:p>
@@ -2512,7 +2512,7 @@
           <a:p>
             <a:fld id="{05487026-7C3F-E447-98E7-AF520D29232F}" type="datetimeFigureOut">
               <a:rPr lang="en-US" smtClean="0"/>
-              <a:t>1/28/16</a:t>
+              <a:t>8/26/16</a:t>
             </a:fld>
             <a:endParaRPr lang="en-US"/>
           </a:p>
@@ -2725,7 +2725,7 @@
           <a:p>
             <a:fld id="{05487026-7C3F-E447-98E7-AF520D29232F}" type="datetimeFigureOut">
               <a:rPr lang="en-US" smtClean="0"/>
-              <a:t>1/28/16</a:t>
+              <a:t>8/26/16</a:t>
             </a:fld>
             <a:endParaRPr lang="en-US"/>
           </a:p>
@@ -3102,7 +3102,7 @@
       </p:grpSpPr>
       <p:pic>
         <p:nvPicPr>
-          <p:cNvPr id="14" name="Picture 13" descr="ProcessedKilobotPic.jpg"/>
+          <p:cNvPr id="2" name="Picture 1" descr="FrictionCoverPhoto.png"/>
           <p:cNvPicPr>
             <a:picLocks noChangeAspect="1"/>
           </p:cNvPicPr>
@@ -3122,8 +3122,8 @@
         </p:blipFill>
         <p:spPr>
           <a:xfrm>
-            <a:off x="0" y="0"/>
-            <a:ext cx="5431692" cy="5443412"/>
+            <a:off x="15875" y="-15588"/>
+            <a:ext cx="5544642" cy="5486400"/>
           </a:xfrm>
           <a:prstGeom prst="rect">
             <a:avLst/>
@@ -3138,8 +3138,8 @@
         </p:nvSpPr>
         <p:spPr>
           <a:xfrm>
-            <a:off x="5922806" y="1796537"/>
-            <a:ext cx="3124651" cy="1938992"/>
+            <a:off x="5508116" y="1442375"/>
+            <a:ext cx="3124651" cy="2308324"/>
           </a:xfrm>
           <a:prstGeom prst="rect">
             <a:avLst/>
@@ -3154,16 +3154,36 @@
           <a:p>
             <a:pPr algn="ctr"/>
             <a:r>
+              <a:rPr lang="en-US" sz="2400" dirty="0">
+                <a:latin typeface="Times New Roman"/>
+                <a:cs typeface="Times New Roman"/>
+              </a:rPr>
+              <a:t>(global control input)</a:t>
+            </a:r>
+          </a:p>
+          <a:p>
+            <a:pPr algn="ctr"/>
+            <a:endParaRPr lang="en-US" sz="2400" dirty="0" smtClean="0">
+              <a:latin typeface="Times New Roman"/>
+              <a:cs typeface="Times New Roman"/>
+            </a:endParaRPr>
+          </a:p>
+          <a:p>
+            <a:pPr algn="ctr"/>
+            <a:r>
               <a:rPr lang="en-US" sz="2400" dirty="0" smtClean="0">
                 <a:latin typeface="Times New Roman"/>
                 <a:cs typeface="Times New Roman"/>
               </a:rPr>
-              <a:t>Distant light </a:t>
-            </a:r>
-            <a:endParaRPr lang="en-US" sz="2400" dirty="0" smtClean="0">
-              <a:latin typeface="Times New Roman"/>
-              <a:cs typeface="Times New Roman"/>
-            </a:endParaRPr>
+              <a:t>Distant </a:t>
+            </a:r>
+            <a:r>
+              <a:rPr lang="en-US" sz="2400" dirty="0" smtClean="0">
+                <a:latin typeface="Times New Roman"/>
+                <a:cs typeface="Times New Roman"/>
+              </a:rPr>
+              <a:t>light </a:t>
+            </a:r>
           </a:p>
           <a:p>
             <a:pPr algn="ctr"/>
@@ -3191,20 +3211,6 @@
           </a:p>
           <a:p>
             <a:pPr algn="ctr"/>
-            <a:endParaRPr lang="en-US" sz="2400" dirty="0">
-              <a:latin typeface="Times New Roman"/>
-              <a:cs typeface="Times New Roman"/>
-            </a:endParaRPr>
-          </a:p>
-          <a:p>
-            <a:pPr algn="ctr"/>
-            <a:r>
-              <a:rPr lang="en-US" sz="2400" dirty="0" smtClean="0">
-                <a:latin typeface="Times New Roman"/>
-                <a:cs typeface="Times New Roman"/>
-              </a:rPr>
-              <a:t>(global control input)</a:t>
-            </a:r>
             <a:endParaRPr lang="en-US" sz="2400" dirty="0">
               <a:latin typeface="Times New Roman"/>
               <a:cs typeface="Times New Roman"/>
@@ -5732,6 +5738,240 @@
           </a:p>
         </p:txBody>
       </p:sp>
+      <p:grpSp>
+        <p:nvGrpSpPr>
+          <p:cNvPr id="103" name="Group 102"/>
+          <p:cNvGrpSpPr/>
+          <p:nvPr/>
+        </p:nvGrpSpPr>
+        <p:grpSpPr>
+          <a:xfrm>
+            <a:off x="5844229" y="2929238"/>
+            <a:ext cx="1828666" cy="2408802"/>
+            <a:chOff x="5588966" y="2461323"/>
+            <a:chExt cx="2266729" cy="3212710"/>
+          </a:xfrm>
+        </p:grpSpPr>
+        <p:sp>
+          <p:nvSpPr>
+            <p:cNvPr id="104" name="TextBox 103"/>
+            <p:cNvSpPr txBox="1"/>
+            <p:nvPr/>
+          </p:nvSpPr>
+          <p:spPr>
+            <a:xfrm>
+              <a:off x="6453258" y="5304701"/>
+              <a:ext cx="855351" cy="369332"/>
+            </a:xfrm>
+            <a:prstGeom prst="rect">
+              <a:avLst/>
+            </a:prstGeom>
+            <a:noFill/>
+          </p:spPr>
+          <p:txBody>
+            <a:bodyPr wrap="square" rtlCol="0">
+              <a:spAutoFit/>
+            </a:bodyPr>
+            <a:lstStyle/>
+            <a:p>
+              <a:r>
+                <a:rPr lang="en-US" dirty="0" smtClean="0">
+                  <a:latin typeface="Times"/>
+                  <a:cs typeface="Times"/>
+                </a:rPr>
+                <a:t>3 cm</a:t>
+              </a:r>
+              <a:endParaRPr lang="en-US" dirty="0">
+                <a:latin typeface="Times"/>
+                <a:cs typeface="Times"/>
+              </a:endParaRPr>
+            </a:p>
+          </p:txBody>
+        </p:sp>
+        <p:pic>
+          <p:nvPicPr>
+            <p:cNvPr id="105" name="Picture 104" descr="Kilobot.png"/>
+            <p:cNvPicPr>
+              <a:picLocks noChangeAspect="1"/>
+            </p:cNvPicPr>
+            <p:nvPr/>
+          </p:nvPicPr>
+          <p:blipFill>
+            <a:blip r:embed="rId3" cstate="screen">
+              <a:extLst>
+                <a:ext uri="{28A0092B-C50C-407E-A947-70E740481C1C}">
+                  <a14:useLocalDpi xmlns:a14="http://schemas.microsoft.com/office/drawing/2010/main"/>
+                </a:ext>
+              </a:extLst>
+            </a:blip>
+            <a:stretch>
+              <a:fillRect/>
+            </a:stretch>
+          </p:blipFill>
+          <p:spPr>
+            <a:xfrm>
+              <a:off x="5588966" y="2461323"/>
+              <a:ext cx="2266729" cy="2902785"/>
+            </a:xfrm>
+            <a:prstGeom prst="rect">
+              <a:avLst/>
+            </a:prstGeom>
+          </p:spPr>
+        </p:pic>
+        <p:cxnSp>
+          <p:nvCxnSpPr>
+            <p:cNvPr id="106" name="Straight Arrow Connector 105"/>
+            <p:cNvCxnSpPr/>
+            <p:nvPr/>
+          </p:nvCxnSpPr>
+          <p:spPr>
+            <a:xfrm flipV="1">
+              <a:off x="6042936" y="5313008"/>
+              <a:ext cx="1604938" cy="5056"/>
+            </a:xfrm>
+            <a:prstGeom prst="straightConnector1">
+              <a:avLst/>
+            </a:prstGeom>
+            <a:ln>
+              <a:solidFill>
+                <a:srgbClr val="FF0000"/>
+              </a:solidFill>
+              <a:headEnd type="arrow"/>
+              <a:tailEnd type="arrow"/>
+            </a:ln>
+          </p:spPr>
+          <p:style>
+            <a:lnRef idx="2">
+              <a:schemeClr val="accent1"/>
+            </a:lnRef>
+            <a:fillRef idx="0">
+              <a:schemeClr val="accent1"/>
+            </a:fillRef>
+            <a:effectRef idx="1">
+              <a:schemeClr val="accent1"/>
+            </a:effectRef>
+            <a:fontRef idx="minor">
+              <a:schemeClr val="tx1"/>
+            </a:fontRef>
+          </p:style>
+        </p:cxnSp>
+      </p:grpSp>
+      <p:sp>
+        <p:nvSpPr>
+          <p:cNvPr id="113" name="Oval 3"/>
+          <p:cNvSpPr>
+            <a:spLocks noChangeArrowheads="1"/>
+          </p:cNvSpPr>
+          <p:nvPr/>
+        </p:nvSpPr>
+        <p:spPr bwMode="auto">
+          <a:xfrm>
+            <a:off x="5813914" y="3062425"/>
+            <a:ext cx="1954231" cy="1892088"/>
+          </a:xfrm>
+          <a:prstGeom prst="ellipse">
+            <a:avLst/>
+          </a:prstGeom>
+          <a:noFill/>
+          <a:ln w="9525">
+            <a:solidFill>
+              <a:schemeClr val="tx1"/>
+            </a:solidFill>
+            <a:round/>
+            <a:headEnd/>
+            <a:tailEnd/>
+          </a:ln>
+          <a:extLst>
+            <a:ext uri="{909E8E84-426E-40dd-AFC4-6F175D3DCCD1}">
+              <a14:hiddenFill xmlns:a14="http://schemas.microsoft.com/office/drawing/2010/main">
+                <a:solidFill>
+                  <a:srgbClr val="FFFFFF"/>
+                </a:solidFill>
+              </a14:hiddenFill>
+            </a:ext>
+          </a:extLst>
+        </p:spPr>
+        <p:txBody>
+          <a:bodyPr/>
+          <a:lstStyle/>
+          <a:p>
+            <a:endParaRPr lang="en-US">
+              <a:ea typeface="ＭＳ Ｐゴシック" charset="0"/>
+              <a:cs typeface="ＭＳ Ｐゴシック" charset="0"/>
+            </a:endParaRPr>
+          </a:p>
+        </p:txBody>
+      </p:sp>
+      <p:cxnSp>
+        <p:nvCxnSpPr>
+          <p:cNvPr id="114" name="Straight Connector 5"/>
+          <p:cNvCxnSpPr>
+            <a:cxnSpLocks noChangeShapeType="1"/>
+            <a:stCxn id="113" idx="0"/>
+          </p:cNvCxnSpPr>
+          <p:nvPr/>
+        </p:nvCxnSpPr>
+        <p:spPr bwMode="auto">
+          <a:xfrm flipH="1" flipV="1">
+            <a:off x="4635500" y="2972390"/>
+            <a:ext cx="2155530" cy="90035"/>
+          </a:xfrm>
+          <a:prstGeom prst="line">
+            <a:avLst/>
+          </a:prstGeom>
+          <a:noFill/>
+          <a:ln w="9525">
+            <a:solidFill>
+              <a:schemeClr val="tx1"/>
+            </a:solidFill>
+            <a:round/>
+            <a:headEnd/>
+            <a:tailEnd/>
+          </a:ln>
+          <a:extLst>
+            <a:ext uri="{909E8E84-426E-40dd-AFC4-6F175D3DCCD1}">
+              <a14:hiddenFill xmlns:a14="http://schemas.microsoft.com/office/drawing/2010/main">
+                <a:noFill/>
+              </a14:hiddenFill>
+            </a:ext>
+          </a:extLst>
+        </p:spPr>
+      </p:cxnSp>
+      <p:cxnSp>
+        <p:nvCxnSpPr>
+          <p:cNvPr id="115" name="Straight Connector 28"/>
+          <p:cNvCxnSpPr>
+            <a:cxnSpLocks noChangeShapeType="1"/>
+            <a:endCxn id="113" idx="3"/>
+          </p:cNvCxnSpPr>
+          <p:nvPr/>
+        </p:nvCxnSpPr>
+        <p:spPr bwMode="auto">
+          <a:xfrm>
+            <a:off x="4635500" y="3157669"/>
+            <a:ext cx="1464605" cy="1519754"/>
+          </a:xfrm>
+          <a:prstGeom prst="line">
+            <a:avLst/>
+          </a:prstGeom>
+          <a:noFill/>
+          <a:ln w="9525">
+            <a:solidFill>
+              <a:schemeClr val="tx1"/>
+            </a:solidFill>
+            <a:round/>
+            <a:headEnd/>
+            <a:tailEnd/>
+          </a:ln>
+          <a:extLst>
+            <a:ext uri="{909E8E84-426E-40dd-AFC4-6F175D3DCCD1}">
+              <a14:hiddenFill xmlns:a14="http://schemas.microsoft.com/office/drawing/2010/main">
+                <a:noFill/>
+              </a14:hiddenFill>
+            </a:ext>
+          </a:extLst>
+        </p:spPr>
+      </p:cxnSp>
     </p:spTree>
     <p:extLst>
       <p:ext uri="{BB962C8B-B14F-4D97-AF65-F5344CB8AC3E}">

</xml_diff>

<commit_message>
New Cover and Set up pictures
</commit_message>
<xml_diff>
--- a/RA-L/pictures/pdf/IntroSwarmPic.pptx
+++ b/RA-L/pictures/pdf/IntroSwarmPic.pptx
@@ -3121,7 +3121,7 @@
           </a:stretch>
         </p:blipFill>
         <p:spPr>
-          <a:xfrm>
+          <a:xfrm rot="5400000">
             <a:off x="15875" y="-15588"/>
             <a:ext cx="5544642" cy="5486400"/>
           </a:xfrm>
@@ -3175,14 +3175,7 @@
                 <a:latin typeface="Times New Roman"/>
                 <a:cs typeface="Times New Roman"/>
               </a:rPr>
-              <a:t>Distant </a:t>
-            </a:r>
-            <a:r>
-              <a:rPr lang="en-US" sz="2400" dirty="0" smtClean="0">
-                <a:latin typeface="Times New Roman"/>
-                <a:cs typeface="Times New Roman"/>
-              </a:rPr>
-              <a:t>light </a:t>
+              <a:t>Distant light </a:t>
             </a:r>
           </a:p>
           <a:p>
@@ -3226,7 +3219,7 @@
         </p:nvSpPr>
         <p:spPr>
           <a:xfrm>
-            <a:off x="1191846" y="3157669"/>
+            <a:off x="1350596" y="1026876"/>
             <a:ext cx="2849743" cy="830997"/>
           </a:xfrm>
           <a:prstGeom prst="rect">
@@ -5912,9 +5905,9 @@
           <p:nvPr/>
         </p:nvCxnSpPr>
         <p:spPr bwMode="auto">
-          <a:xfrm flipH="1" flipV="1">
-            <a:off x="4635500" y="2972390"/>
-            <a:ext cx="2155530" cy="90035"/>
+          <a:xfrm flipH="1">
+            <a:off x="5270500" y="3062425"/>
+            <a:ext cx="1520530" cy="120080"/>
           </a:xfrm>
           <a:prstGeom prst="line">
             <a:avLst/>
@@ -5948,8 +5941,8 @@
         </p:nvCxnSpPr>
         <p:spPr bwMode="auto">
           <a:xfrm>
-            <a:off x="4635500" y="3157669"/>
-            <a:ext cx="1464605" cy="1519754"/>
+            <a:off x="5159375" y="3371927"/>
+            <a:ext cx="940730" cy="1305496"/>
           </a:xfrm>
           <a:prstGeom prst="line">
             <a:avLst/>

</xml_diff>

<commit_message>
Changed the covariance Results!
</commit_message>
<xml_diff>
--- a/RA-L/pictures/pdf/IntroSwarmPic.pptx
+++ b/RA-L/pictures/pdf/IntroSwarmPic.pptx
@@ -5964,6 +5964,79 @@
             </a:ext>
           </a:extLst>
         </p:spPr>
+      </p:cxnSp>
+      <p:sp>
+        <p:nvSpPr>
+          <p:cNvPr id="99" name="TextBox 98"/>
+          <p:cNvSpPr txBox="1"/>
+          <p:nvPr/>
+        </p:nvSpPr>
+        <p:spPr>
+          <a:xfrm>
+            <a:off x="7983288" y="4148063"/>
+            <a:ext cx="690048" cy="276915"/>
+          </a:xfrm>
+          <a:prstGeom prst="rect">
+            <a:avLst/>
+          </a:prstGeom>
+          <a:noFill/>
+        </p:spPr>
+        <p:txBody>
+          <a:bodyPr wrap="square" rtlCol="0">
+            <a:spAutoFit/>
+          </a:bodyPr>
+          <a:lstStyle/>
+          <a:p>
+            <a:r>
+              <a:rPr lang="en-US" dirty="0" smtClean="0">
+                <a:latin typeface="Times"/>
+                <a:cs typeface="Times"/>
+              </a:rPr>
+              <a:t>3 cm</a:t>
+            </a:r>
+            <a:endParaRPr lang="en-US" dirty="0">
+              <a:latin typeface="Times"/>
+              <a:cs typeface="Times"/>
+            </a:endParaRPr>
+          </a:p>
+        </p:txBody>
+      </p:sp>
+      <p:cxnSp>
+        <p:nvCxnSpPr>
+          <p:cNvPr id="100" name="Straight Arrow Connector 99"/>
+          <p:cNvCxnSpPr/>
+          <p:nvPr/>
+        </p:nvCxnSpPr>
+        <p:spPr>
+          <a:xfrm>
+            <a:off x="7907754" y="3750699"/>
+            <a:ext cx="0" cy="1168260"/>
+          </a:xfrm>
+          <a:prstGeom prst="straightConnector1">
+            <a:avLst/>
+          </a:prstGeom>
+          <a:ln>
+            <a:solidFill>
+              <a:srgbClr val="FF0000"/>
+            </a:solidFill>
+            <a:headEnd type="arrow"/>
+            <a:tailEnd type="arrow"/>
+          </a:ln>
+        </p:spPr>
+        <p:style>
+          <a:lnRef idx="2">
+            <a:schemeClr val="accent1"/>
+          </a:lnRef>
+          <a:fillRef idx="0">
+            <a:schemeClr val="accent1"/>
+          </a:fillRef>
+          <a:effectRef idx="1">
+            <a:schemeClr val="accent1"/>
+          </a:effectRef>
+          <a:fontRef idx="minor">
+            <a:schemeClr val="tx1"/>
+          </a:fontRef>
+        </p:style>
       </p:cxnSp>
     </p:spTree>
     <p:extLst>

</xml_diff>